<commit_message>
reveiw the power point presentation
</commit_message>
<xml_diff>
--- a/presentation/webScraping-python.pptx
+++ b/presentation/webScraping-python.pptx
@@ -288,6 +288,11 @@
       </a:defRPr>
     </a:lvl9pPr>
   </p:defaultTextStyle>
+  <p:extLst>
+    <p:ext uri="{EFAFB233-063F-42B5-8137-9DF3F51BA10A}">
+      <p15:sldGuideLst xmlns:p15="http://schemas.microsoft.com/office/powerpoint/2012/main"/>
+    </p:ext>
+  </p:extLst>
 </p:presentation>
 </file>
 
@@ -30424,7 +30429,7 @@
                   <a:srgbClr val="0E2A47"/>
                 </a:solidFill>
               </a:rPr>
-              <a:t>ui interface</a:t>
+              <a:t>ui</a:t>
             </a:r>
             <a:endParaRPr dirty="0">
               <a:solidFill>

</xml_diff>

<commit_message>
final editing on presentation
</commit_message>
<xml_diff>
--- a/presentation/webScraping-python.pptx
+++ b/presentation/webScraping-python.pptx
@@ -37415,22 +37415,6 @@
               </a:spcAft>
               <a:buNone/>
             </a:pPr>
-            <a:r>
-              <a:rPr lang="en-US" dirty="0"/>
-              <a:t>Special thanks for Dr.Ali Komati and Dr.Yasser Fadlallah for supporting us</a:t>
-            </a:r>
-            <a:endParaRPr sz="1000" dirty="0"/>
-          </a:p>
-          <a:p>
-            <a:pPr marL="0" lvl="0" indent="0" algn="l" rtl="0">
-              <a:spcBef>
-                <a:spcPts val="0"/>
-              </a:spcBef>
-              <a:spcAft>
-                <a:spcPts val="0"/>
-              </a:spcAft>
-              <a:buNone/>
-            </a:pPr>
             <a:endParaRPr sz="1000" dirty="0"/>
           </a:p>
           <a:p>
@@ -50617,10 +50601,7 @@
             </a:lvl9pPr>
           </a:lstStyle>
           <a:p>
-            <a:r>
-              <a:rPr lang="en-US" dirty="0"/>
-              <a:t>Now lets see the demo !</a:t>
-            </a:r>
+            <a:endParaRPr lang="en-US" dirty="0"/>
           </a:p>
         </p:txBody>
       </p:sp>

</xml_diff>